<commit_message>
docs 2D parallel figure
</commit_message>
<xml_diff>
--- a/docs/figs/dist.pptx
+++ b/docs/figs/dist.pptx
@@ -104,6 +104,11 @@
       </a:defRPr>
     </a:lvl9pPr>
   </p:defaultTextStyle>
+  <p:extLst>
+    <p:ext uri="{EFAFB233-063F-42B5-8137-9DF3F51BA10A}">
+      <p15:sldGuideLst xmlns:p15="http://schemas.microsoft.com/office/powerpoint/2012/main"/>
+    </p:ext>
+  </p:extLst>
 </p:presentation>
 </file>
 
@@ -3822,6 +3827,1252 @@
           </a:p>
         </p:txBody>
       </p:sp>
+      <p:sp>
+        <p:nvSpPr>
+          <p:cNvPr id="23" name="Rectangle 22"/>
+          <p:cNvSpPr/>
+          <p:nvPr/>
+        </p:nvSpPr>
+        <p:spPr>
+          <a:xfrm>
+            <a:off x="5159168" y="1552169"/>
+            <a:ext cx="963397" cy="1056825"/>
+          </a:xfrm>
+          <a:prstGeom prst="rect">
+            <a:avLst/>
+          </a:prstGeom>
+          <a:solidFill>
+            <a:schemeClr val="accent1">
+              <a:alpha val="25000"/>
+            </a:schemeClr>
+          </a:solidFill>
+          <a:ln>
+            <a:noFill/>
+          </a:ln>
+        </p:spPr>
+        <p:style>
+          <a:lnRef idx="2">
+            <a:schemeClr val="accent2"/>
+          </a:lnRef>
+          <a:fillRef idx="1">
+            <a:schemeClr val="lt1"/>
+          </a:fillRef>
+          <a:effectRef idx="0">
+            <a:schemeClr val="accent2"/>
+          </a:effectRef>
+          <a:fontRef idx="minor">
+            <a:schemeClr val="dk1"/>
+          </a:fontRef>
+        </p:style>
+        <p:txBody>
+          <a:bodyPr rtlCol="0" anchor="ctr"/>
+          <a:lstStyle/>
+          <a:p>
+            <a:pPr algn="ctr"/>
+            <a:endParaRPr lang="en-US"/>
+          </a:p>
+        </p:txBody>
+      </p:sp>
+      <p:sp>
+        <p:nvSpPr>
+          <p:cNvPr id="24" name="TextBox 23"/>
+          <p:cNvSpPr txBox="1"/>
+          <p:nvPr/>
+        </p:nvSpPr>
+        <p:spPr>
+          <a:xfrm>
+            <a:off x="4679860" y="1894300"/>
+            <a:ext cx="359394" cy="338554"/>
+          </a:xfrm>
+          <a:prstGeom prst="rect">
+            <a:avLst/>
+          </a:prstGeom>
+          <a:noFill/>
+        </p:spPr>
+        <p:txBody>
+          <a:bodyPr wrap="none" rtlCol="0">
+            <a:spAutoFit/>
+          </a:bodyPr>
+          <a:lstStyle/>
+          <a:p>
+            <a:r>
+              <a:rPr lang="en-US" sz="1600" dirty="0" smtClean="0">
+                <a:solidFill>
+                  <a:schemeClr val="tx2"/>
+                </a:solidFill>
+                <a:cs typeface="Neo Sans Intel"/>
+              </a:rPr>
+              <a:t>P</a:t>
+            </a:r>
+            <a:r>
+              <a:rPr lang="en-US" sz="1600" baseline="-25000" dirty="0">
+                <a:solidFill>
+                  <a:schemeClr val="tx2"/>
+                </a:solidFill>
+                <a:cs typeface="Neo Sans Intel"/>
+              </a:rPr>
+              <a:t>0</a:t>
+            </a:r>
+            <a:endParaRPr lang="en-US" sz="1600" dirty="0" smtClean="0">
+              <a:solidFill>
+                <a:schemeClr val="tx2"/>
+              </a:solidFill>
+              <a:cs typeface="Neo Sans Intel"/>
+            </a:endParaRPr>
+          </a:p>
+        </p:txBody>
+      </p:sp>
+      <p:sp>
+        <p:nvSpPr>
+          <p:cNvPr id="26" name="TextBox 25"/>
+          <p:cNvSpPr txBox="1"/>
+          <p:nvPr/>
+        </p:nvSpPr>
+        <p:spPr>
+          <a:xfrm>
+            <a:off x="5249426" y="1609073"/>
+            <a:ext cx="963398" cy="369332"/>
+          </a:xfrm>
+          <a:prstGeom prst="rect">
+            <a:avLst/>
+          </a:prstGeom>
+          <a:noFill/>
+        </p:spPr>
+        <p:txBody>
+          <a:bodyPr wrap="square" rtlCol="0">
+            <a:spAutoFit/>
+          </a:bodyPr>
+          <a:lstStyle/>
+          <a:p>
+            <a:r>
+              <a:rPr lang="en-US" dirty="0" smtClean="0">
+                <a:solidFill>
+                  <a:schemeClr val="tx2"/>
+                </a:solidFill>
+                <a:cs typeface="Neo Sans Intel"/>
+              </a:rPr>
+              <a:t>a</a:t>
+            </a:r>
+            <a:r>
+              <a:rPr lang="en-US" baseline="-25000" dirty="0" smtClean="0">
+                <a:solidFill>
+                  <a:schemeClr val="tx2"/>
+                </a:solidFill>
+                <a:cs typeface="Neo Sans Intel"/>
+              </a:rPr>
+              <a:t>00</a:t>
+            </a:r>
+            <a:r>
+              <a:rPr lang="en-US" dirty="0" smtClean="0">
+                <a:solidFill>
+                  <a:schemeClr val="tx2"/>
+                </a:solidFill>
+                <a:cs typeface="Neo Sans Intel"/>
+              </a:rPr>
+              <a:t>  a</a:t>
+            </a:r>
+            <a:r>
+              <a:rPr lang="en-US" baseline="-25000" dirty="0" smtClean="0">
+                <a:solidFill>
+                  <a:schemeClr val="tx2"/>
+                </a:solidFill>
+                <a:cs typeface="Neo Sans Intel"/>
+              </a:rPr>
+              <a:t>01</a:t>
+            </a:r>
+            <a:endParaRPr lang="en-US" dirty="0" smtClean="0">
+              <a:solidFill>
+                <a:schemeClr val="tx2"/>
+              </a:solidFill>
+              <a:cs typeface="Neo Sans Intel"/>
+            </a:endParaRPr>
+          </a:p>
+        </p:txBody>
+      </p:sp>
+      <p:sp>
+        <p:nvSpPr>
+          <p:cNvPr id="25" name="Double Bracket 24"/>
+          <p:cNvSpPr/>
+          <p:nvPr/>
+        </p:nvSpPr>
+        <p:spPr>
+          <a:xfrm rot="5400000">
+            <a:off x="5190859" y="1653576"/>
+            <a:ext cx="914400" cy="850392"/>
+          </a:xfrm>
+          <a:prstGeom prst="bracketPair">
+            <a:avLst/>
+          </a:prstGeom>
+          <a:ln>
+            <a:solidFill>
+              <a:schemeClr val="tx2"/>
+            </a:solidFill>
+          </a:ln>
+          <a:effectLst/>
+        </p:spPr>
+        <p:style>
+          <a:lnRef idx="2">
+            <a:schemeClr val="accent1"/>
+          </a:lnRef>
+          <a:fillRef idx="0">
+            <a:schemeClr val="accent1"/>
+          </a:fillRef>
+          <a:effectRef idx="1">
+            <a:schemeClr val="accent1"/>
+          </a:effectRef>
+          <a:fontRef idx="minor">
+            <a:schemeClr val="tx1"/>
+          </a:fontRef>
+        </p:style>
+        <p:txBody>
+          <a:bodyPr numCol="1" spcCol="914400" rtlCol="0" anchor="ctr"/>
+          <a:lstStyle/>
+          <a:p>
+            <a:pPr algn="just"/>
+            <a:endParaRPr lang="en-US" baseline="-25000" dirty="0"/>
+          </a:p>
+        </p:txBody>
+      </p:sp>
+      <p:sp>
+        <p:nvSpPr>
+          <p:cNvPr id="28" name="TextBox 27"/>
+          <p:cNvSpPr txBox="1"/>
+          <p:nvPr/>
+        </p:nvSpPr>
+        <p:spPr>
+          <a:xfrm>
+            <a:off x="5249425" y="1863522"/>
+            <a:ext cx="902800" cy="369332"/>
+          </a:xfrm>
+          <a:prstGeom prst="rect">
+            <a:avLst/>
+          </a:prstGeom>
+          <a:noFill/>
+        </p:spPr>
+        <p:txBody>
+          <a:bodyPr wrap="square" rtlCol="0">
+            <a:spAutoFit/>
+          </a:bodyPr>
+          <a:lstStyle/>
+          <a:p>
+            <a:r>
+              <a:rPr lang="en-US" dirty="0" smtClean="0">
+                <a:solidFill>
+                  <a:schemeClr val="tx2"/>
+                </a:solidFill>
+                <a:cs typeface="Neo Sans Intel"/>
+              </a:rPr>
+              <a:t>a</a:t>
+            </a:r>
+            <a:r>
+              <a:rPr lang="en-US" baseline="-25000" dirty="0" smtClean="0">
+                <a:solidFill>
+                  <a:schemeClr val="tx2"/>
+                </a:solidFill>
+                <a:cs typeface="Neo Sans Intel"/>
+              </a:rPr>
+              <a:t>10</a:t>
+            </a:r>
+            <a:r>
+              <a:rPr lang="en-US" dirty="0" smtClean="0">
+                <a:solidFill>
+                  <a:schemeClr val="tx2"/>
+                </a:solidFill>
+                <a:cs typeface="Neo Sans Intel"/>
+              </a:rPr>
+              <a:t>  </a:t>
+            </a:r>
+            <a:r>
+              <a:rPr lang="en-US" dirty="0" smtClean="0">
+                <a:solidFill>
+                  <a:schemeClr val="tx2"/>
+                </a:solidFill>
+                <a:cs typeface="Neo Sans Intel"/>
+              </a:rPr>
+              <a:t>a</a:t>
+            </a:r>
+            <a:r>
+              <a:rPr lang="en-US" baseline="-25000" dirty="0" smtClean="0">
+                <a:solidFill>
+                  <a:schemeClr val="tx2"/>
+                </a:solidFill>
+                <a:cs typeface="Neo Sans Intel"/>
+              </a:rPr>
+              <a:t>11</a:t>
+            </a:r>
+            <a:endParaRPr lang="en-US" dirty="0" smtClean="0">
+              <a:solidFill>
+                <a:schemeClr val="tx2"/>
+              </a:solidFill>
+              <a:cs typeface="Neo Sans Intel"/>
+            </a:endParaRPr>
+          </a:p>
+        </p:txBody>
+      </p:sp>
+      <p:sp>
+        <p:nvSpPr>
+          <p:cNvPr id="31" name="TextBox 30"/>
+          <p:cNvSpPr txBox="1"/>
+          <p:nvPr/>
+        </p:nvSpPr>
+        <p:spPr>
+          <a:xfrm>
+            <a:off x="4682132" y="3070288"/>
+            <a:ext cx="359394" cy="338554"/>
+          </a:xfrm>
+          <a:prstGeom prst="rect">
+            <a:avLst/>
+          </a:prstGeom>
+          <a:noFill/>
+        </p:spPr>
+        <p:txBody>
+          <a:bodyPr wrap="none" rtlCol="0">
+            <a:spAutoFit/>
+          </a:bodyPr>
+          <a:lstStyle/>
+          <a:p>
+            <a:r>
+              <a:rPr lang="en-US" sz="1600" dirty="0" smtClean="0">
+                <a:solidFill>
+                  <a:schemeClr val="tx2"/>
+                </a:solidFill>
+                <a:cs typeface="Neo Sans Intel"/>
+              </a:rPr>
+              <a:t>P</a:t>
+            </a:r>
+            <a:r>
+              <a:rPr lang="en-US" sz="1600" baseline="-25000" dirty="0">
+                <a:solidFill>
+                  <a:schemeClr val="tx2"/>
+                </a:solidFill>
+                <a:cs typeface="Neo Sans Intel"/>
+              </a:rPr>
+              <a:t>1</a:t>
+            </a:r>
+            <a:endParaRPr lang="en-US" sz="1600" dirty="0" smtClean="0">
+              <a:solidFill>
+                <a:schemeClr val="tx2"/>
+              </a:solidFill>
+              <a:cs typeface="Neo Sans Intel"/>
+            </a:endParaRPr>
+          </a:p>
+        </p:txBody>
+      </p:sp>
+      <p:sp>
+        <p:nvSpPr>
+          <p:cNvPr id="37" name="TextBox 36"/>
+          <p:cNvSpPr txBox="1"/>
+          <p:nvPr/>
+        </p:nvSpPr>
+        <p:spPr>
+          <a:xfrm>
+            <a:off x="4682132" y="4243994"/>
+            <a:ext cx="359394" cy="338554"/>
+          </a:xfrm>
+          <a:prstGeom prst="rect">
+            <a:avLst/>
+          </a:prstGeom>
+          <a:noFill/>
+        </p:spPr>
+        <p:txBody>
+          <a:bodyPr wrap="none" rtlCol="0">
+            <a:spAutoFit/>
+          </a:bodyPr>
+          <a:lstStyle/>
+          <a:p>
+            <a:r>
+              <a:rPr lang="en-US" sz="1600" dirty="0" smtClean="0">
+                <a:solidFill>
+                  <a:schemeClr val="tx2"/>
+                </a:solidFill>
+                <a:cs typeface="Neo Sans Intel"/>
+              </a:rPr>
+              <a:t>P</a:t>
+            </a:r>
+            <a:r>
+              <a:rPr lang="en-US" sz="1600" baseline="-25000" dirty="0" smtClean="0">
+                <a:solidFill>
+                  <a:schemeClr val="tx2"/>
+                </a:solidFill>
+                <a:cs typeface="Neo Sans Intel"/>
+              </a:rPr>
+              <a:t>2</a:t>
+            </a:r>
+            <a:endParaRPr lang="en-US" sz="1600" dirty="0" smtClean="0">
+              <a:solidFill>
+                <a:schemeClr val="tx2"/>
+              </a:solidFill>
+              <a:cs typeface="Neo Sans Intel"/>
+            </a:endParaRPr>
+          </a:p>
+        </p:txBody>
+      </p:sp>
+      <p:sp>
+        <p:nvSpPr>
+          <p:cNvPr id="54" name="TextBox 53"/>
+          <p:cNvSpPr txBox="1"/>
+          <p:nvPr/>
+        </p:nvSpPr>
+        <p:spPr>
+          <a:xfrm>
+            <a:off x="5249423" y="2108544"/>
+            <a:ext cx="902800" cy="369332"/>
+          </a:xfrm>
+          <a:prstGeom prst="rect">
+            <a:avLst/>
+          </a:prstGeom>
+          <a:noFill/>
+        </p:spPr>
+        <p:txBody>
+          <a:bodyPr wrap="square" rtlCol="0">
+            <a:spAutoFit/>
+          </a:bodyPr>
+          <a:lstStyle/>
+          <a:p>
+            <a:r>
+              <a:rPr lang="en-US" dirty="0" smtClean="0">
+                <a:solidFill>
+                  <a:schemeClr val="tx2"/>
+                </a:solidFill>
+                <a:cs typeface="Neo Sans Intel"/>
+              </a:rPr>
+              <a:t>a</a:t>
+            </a:r>
+            <a:r>
+              <a:rPr lang="en-US" baseline="-25000" dirty="0" smtClean="0">
+                <a:solidFill>
+                  <a:schemeClr val="tx2"/>
+                </a:solidFill>
+                <a:cs typeface="Neo Sans Intel"/>
+              </a:rPr>
+              <a:t>20</a:t>
+            </a:r>
+            <a:r>
+              <a:rPr lang="en-US" dirty="0" smtClean="0">
+                <a:solidFill>
+                  <a:schemeClr val="tx2"/>
+                </a:solidFill>
+                <a:cs typeface="Neo Sans Intel"/>
+              </a:rPr>
+              <a:t>  </a:t>
+            </a:r>
+            <a:r>
+              <a:rPr lang="en-US" dirty="0" smtClean="0">
+                <a:solidFill>
+                  <a:schemeClr val="tx2"/>
+                </a:solidFill>
+                <a:cs typeface="Neo Sans Intel"/>
+              </a:rPr>
+              <a:t>a</a:t>
+            </a:r>
+            <a:r>
+              <a:rPr lang="en-US" baseline="-25000" dirty="0" smtClean="0">
+                <a:solidFill>
+                  <a:schemeClr val="tx2"/>
+                </a:solidFill>
+                <a:cs typeface="Neo Sans Intel"/>
+              </a:rPr>
+              <a:t>21</a:t>
+            </a:r>
+            <a:endParaRPr lang="en-US" dirty="0" smtClean="0">
+              <a:solidFill>
+                <a:schemeClr val="tx2"/>
+              </a:solidFill>
+              <a:cs typeface="Neo Sans Intel"/>
+            </a:endParaRPr>
+          </a:p>
+        </p:txBody>
+      </p:sp>
+      <p:sp>
+        <p:nvSpPr>
+          <p:cNvPr id="55" name="Rectangle 54"/>
+          <p:cNvSpPr/>
+          <p:nvPr/>
+        </p:nvSpPr>
+        <p:spPr>
+          <a:xfrm>
+            <a:off x="5129510" y="2739533"/>
+            <a:ext cx="993055" cy="1056825"/>
+          </a:xfrm>
+          <a:prstGeom prst="rect">
+            <a:avLst/>
+          </a:prstGeom>
+          <a:solidFill>
+            <a:schemeClr val="accent2">
+              <a:alpha val="25000"/>
+            </a:schemeClr>
+          </a:solidFill>
+          <a:ln>
+            <a:noFill/>
+          </a:ln>
+        </p:spPr>
+        <p:style>
+          <a:lnRef idx="2">
+            <a:schemeClr val="accent2"/>
+          </a:lnRef>
+          <a:fillRef idx="1">
+            <a:schemeClr val="lt1"/>
+          </a:fillRef>
+          <a:effectRef idx="0">
+            <a:schemeClr val="accent2"/>
+          </a:effectRef>
+          <a:fontRef idx="minor">
+            <a:schemeClr val="dk1"/>
+          </a:fontRef>
+        </p:style>
+        <p:txBody>
+          <a:bodyPr rtlCol="0" anchor="ctr"/>
+          <a:lstStyle/>
+          <a:p>
+            <a:pPr algn="ctr"/>
+            <a:endParaRPr lang="en-US"/>
+          </a:p>
+        </p:txBody>
+      </p:sp>
+      <p:sp>
+        <p:nvSpPr>
+          <p:cNvPr id="56" name="Double Bracket 55"/>
+          <p:cNvSpPr/>
+          <p:nvPr/>
+        </p:nvSpPr>
+        <p:spPr>
+          <a:xfrm rot="5400000">
+            <a:off x="5174849" y="2840939"/>
+            <a:ext cx="914400" cy="850392"/>
+          </a:xfrm>
+          <a:prstGeom prst="bracketPair">
+            <a:avLst/>
+          </a:prstGeom>
+          <a:ln>
+            <a:solidFill>
+              <a:schemeClr val="tx2"/>
+            </a:solidFill>
+          </a:ln>
+          <a:effectLst/>
+        </p:spPr>
+        <p:style>
+          <a:lnRef idx="2">
+            <a:schemeClr val="accent1"/>
+          </a:lnRef>
+          <a:fillRef idx="0">
+            <a:schemeClr val="accent1"/>
+          </a:fillRef>
+          <a:effectRef idx="1">
+            <a:schemeClr val="accent1"/>
+          </a:effectRef>
+          <a:fontRef idx="minor">
+            <a:schemeClr val="tx1"/>
+          </a:fontRef>
+        </p:style>
+        <p:txBody>
+          <a:bodyPr numCol="1" spcCol="914400" rtlCol="0" anchor="ctr"/>
+          <a:lstStyle/>
+          <a:p>
+            <a:pPr algn="just"/>
+            <a:endParaRPr lang="en-US" baseline="-25000" dirty="0"/>
+          </a:p>
+        </p:txBody>
+      </p:sp>
+      <p:sp>
+        <p:nvSpPr>
+          <p:cNvPr id="57" name="TextBox 56"/>
+          <p:cNvSpPr txBox="1"/>
+          <p:nvPr/>
+        </p:nvSpPr>
+        <p:spPr>
+          <a:xfrm>
+            <a:off x="5219768" y="2796437"/>
+            <a:ext cx="932455" cy="369332"/>
+          </a:xfrm>
+          <a:prstGeom prst="rect">
+            <a:avLst/>
+          </a:prstGeom>
+          <a:noFill/>
+        </p:spPr>
+        <p:txBody>
+          <a:bodyPr wrap="square" rtlCol="0">
+            <a:spAutoFit/>
+          </a:bodyPr>
+          <a:lstStyle/>
+          <a:p>
+            <a:r>
+              <a:rPr lang="en-US" dirty="0" smtClean="0">
+                <a:solidFill>
+                  <a:schemeClr val="tx2"/>
+                </a:solidFill>
+                <a:cs typeface="Neo Sans Intel"/>
+              </a:rPr>
+              <a:t>a</a:t>
+            </a:r>
+            <a:r>
+              <a:rPr lang="en-US" baseline="-25000" dirty="0">
+                <a:solidFill>
+                  <a:schemeClr val="tx2"/>
+                </a:solidFill>
+                <a:cs typeface="Neo Sans Intel"/>
+              </a:rPr>
+              <a:t>3</a:t>
+            </a:r>
+            <a:r>
+              <a:rPr lang="en-US" baseline="-25000" dirty="0" smtClean="0">
+                <a:solidFill>
+                  <a:schemeClr val="tx2"/>
+                </a:solidFill>
+                <a:cs typeface="Neo Sans Intel"/>
+              </a:rPr>
+              <a:t>0</a:t>
+            </a:r>
+            <a:r>
+              <a:rPr lang="en-US" dirty="0" smtClean="0">
+                <a:solidFill>
+                  <a:schemeClr val="tx2"/>
+                </a:solidFill>
+                <a:cs typeface="Neo Sans Intel"/>
+              </a:rPr>
+              <a:t>  a</a:t>
+            </a:r>
+            <a:r>
+              <a:rPr lang="en-US" baseline="-25000" dirty="0">
+                <a:solidFill>
+                  <a:schemeClr val="tx2"/>
+                </a:solidFill>
+                <a:cs typeface="Neo Sans Intel"/>
+              </a:rPr>
+              <a:t>3</a:t>
+            </a:r>
+            <a:r>
+              <a:rPr lang="en-US" baseline="-25000" dirty="0" smtClean="0">
+                <a:solidFill>
+                  <a:schemeClr val="tx2"/>
+                </a:solidFill>
+                <a:cs typeface="Neo Sans Intel"/>
+              </a:rPr>
+              <a:t>1</a:t>
+            </a:r>
+            <a:endParaRPr lang="en-US" dirty="0" smtClean="0">
+              <a:solidFill>
+                <a:schemeClr val="tx2"/>
+              </a:solidFill>
+              <a:cs typeface="Neo Sans Intel"/>
+            </a:endParaRPr>
+          </a:p>
+        </p:txBody>
+      </p:sp>
+      <p:sp>
+        <p:nvSpPr>
+          <p:cNvPr id="58" name="TextBox 57"/>
+          <p:cNvSpPr txBox="1"/>
+          <p:nvPr/>
+        </p:nvSpPr>
+        <p:spPr>
+          <a:xfrm>
+            <a:off x="5219767" y="3050886"/>
+            <a:ext cx="902800" cy="369332"/>
+          </a:xfrm>
+          <a:prstGeom prst="rect">
+            <a:avLst/>
+          </a:prstGeom>
+          <a:noFill/>
+        </p:spPr>
+        <p:txBody>
+          <a:bodyPr wrap="square" rtlCol="0">
+            <a:spAutoFit/>
+          </a:bodyPr>
+          <a:lstStyle/>
+          <a:p>
+            <a:r>
+              <a:rPr lang="en-US" dirty="0" smtClean="0">
+                <a:solidFill>
+                  <a:schemeClr val="tx2"/>
+                </a:solidFill>
+                <a:cs typeface="Neo Sans Intel"/>
+              </a:rPr>
+              <a:t>a</a:t>
+            </a:r>
+            <a:r>
+              <a:rPr lang="en-US" baseline="-25000" dirty="0">
+                <a:solidFill>
+                  <a:schemeClr val="tx2"/>
+                </a:solidFill>
+                <a:cs typeface="Neo Sans Intel"/>
+              </a:rPr>
+              <a:t>4</a:t>
+            </a:r>
+            <a:r>
+              <a:rPr lang="en-US" baseline="-25000" dirty="0" smtClean="0">
+                <a:solidFill>
+                  <a:schemeClr val="tx2"/>
+                </a:solidFill>
+                <a:cs typeface="Neo Sans Intel"/>
+              </a:rPr>
+              <a:t>0</a:t>
+            </a:r>
+            <a:r>
+              <a:rPr lang="en-US" dirty="0" smtClean="0">
+                <a:solidFill>
+                  <a:schemeClr val="tx2"/>
+                </a:solidFill>
+                <a:cs typeface="Neo Sans Intel"/>
+              </a:rPr>
+              <a:t>  </a:t>
+            </a:r>
+            <a:r>
+              <a:rPr lang="en-US" dirty="0" smtClean="0">
+                <a:solidFill>
+                  <a:schemeClr val="tx2"/>
+                </a:solidFill>
+                <a:cs typeface="Neo Sans Intel"/>
+              </a:rPr>
+              <a:t>a</a:t>
+            </a:r>
+            <a:r>
+              <a:rPr lang="en-US" baseline="-25000" dirty="0">
+                <a:solidFill>
+                  <a:schemeClr val="tx2"/>
+                </a:solidFill>
+                <a:cs typeface="Neo Sans Intel"/>
+              </a:rPr>
+              <a:t>4</a:t>
+            </a:r>
+            <a:r>
+              <a:rPr lang="en-US" baseline="-25000" dirty="0" smtClean="0">
+                <a:solidFill>
+                  <a:schemeClr val="tx2"/>
+                </a:solidFill>
+                <a:cs typeface="Neo Sans Intel"/>
+              </a:rPr>
+              <a:t>1</a:t>
+            </a:r>
+            <a:endParaRPr lang="en-US" dirty="0" smtClean="0">
+              <a:solidFill>
+                <a:schemeClr val="tx2"/>
+              </a:solidFill>
+              <a:cs typeface="Neo Sans Intel"/>
+            </a:endParaRPr>
+          </a:p>
+        </p:txBody>
+      </p:sp>
+      <p:sp>
+        <p:nvSpPr>
+          <p:cNvPr id="59" name="TextBox 58"/>
+          <p:cNvSpPr txBox="1"/>
+          <p:nvPr/>
+        </p:nvSpPr>
+        <p:spPr>
+          <a:xfrm>
+            <a:off x="5219765" y="3295908"/>
+            <a:ext cx="902800" cy="369332"/>
+          </a:xfrm>
+          <a:prstGeom prst="rect">
+            <a:avLst/>
+          </a:prstGeom>
+          <a:noFill/>
+        </p:spPr>
+        <p:txBody>
+          <a:bodyPr wrap="square" rtlCol="0">
+            <a:spAutoFit/>
+          </a:bodyPr>
+          <a:lstStyle/>
+          <a:p>
+            <a:r>
+              <a:rPr lang="en-US" dirty="0" smtClean="0">
+                <a:solidFill>
+                  <a:schemeClr val="tx2"/>
+                </a:solidFill>
+                <a:cs typeface="Neo Sans Intel"/>
+              </a:rPr>
+              <a:t>a</a:t>
+            </a:r>
+            <a:r>
+              <a:rPr lang="en-US" baseline="-25000" dirty="0">
+                <a:solidFill>
+                  <a:schemeClr val="tx2"/>
+                </a:solidFill>
+                <a:cs typeface="Neo Sans Intel"/>
+              </a:rPr>
+              <a:t>5</a:t>
+            </a:r>
+            <a:r>
+              <a:rPr lang="en-US" baseline="-25000" dirty="0" smtClean="0">
+                <a:solidFill>
+                  <a:schemeClr val="tx2"/>
+                </a:solidFill>
+                <a:cs typeface="Neo Sans Intel"/>
+              </a:rPr>
+              <a:t>0</a:t>
+            </a:r>
+            <a:r>
+              <a:rPr lang="en-US" dirty="0" smtClean="0">
+                <a:solidFill>
+                  <a:schemeClr val="tx2"/>
+                </a:solidFill>
+                <a:cs typeface="Neo Sans Intel"/>
+              </a:rPr>
+              <a:t>  </a:t>
+            </a:r>
+            <a:r>
+              <a:rPr lang="en-US" dirty="0" smtClean="0">
+                <a:solidFill>
+                  <a:schemeClr val="tx2"/>
+                </a:solidFill>
+                <a:cs typeface="Neo Sans Intel"/>
+              </a:rPr>
+              <a:t>a</a:t>
+            </a:r>
+            <a:r>
+              <a:rPr lang="en-US" baseline="-25000" dirty="0">
+                <a:solidFill>
+                  <a:schemeClr val="tx2"/>
+                </a:solidFill>
+                <a:cs typeface="Neo Sans Intel"/>
+              </a:rPr>
+              <a:t>5</a:t>
+            </a:r>
+            <a:r>
+              <a:rPr lang="en-US" baseline="-25000" dirty="0" smtClean="0">
+                <a:solidFill>
+                  <a:schemeClr val="tx2"/>
+                </a:solidFill>
+                <a:cs typeface="Neo Sans Intel"/>
+              </a:rPr>
+              <a:t>1</a:t>
+            </a:r>
+            <a:endParaRPr lang="en-US" dirty="0" smtClean="0">
+              <a:solidFill>
+                <a:schemeClr val="tx2"/>
+              </a:solidFill>
+              <a:cs typeface="Neo Sans Intel"/>
+            </a:endParaRPr>
+          </a:p>
+        </p:txBody>
+      </p:sp>
+      <p:sp>
+        <p:nvSpPr>
+          <p:cNvPr id="65" name="Rectangle 64"/>
+          <p:cNvSpPr/>
+          <p:nvPr/>
+        </p:nvSpPr>
+        <p:spPr>
+          <a:xfrm>
+            <a:off x="5159168" y="3914976"/>
+            <a:ext cx="993055" cy="1056825"/>
+          </a:xfrm>
+          <a:prstGeom prst="rect">
+            <a:avLst/>
+          </a:prstGeom>
+          <a:solidFill>
+            <a:schemeClr val="accent6">
+              <a:alpha val="25000"/>
+            </a:schemeClr>
+          </a:solidFill>
+          <a:ln>
+            <a:noFill/>
+          </a:ln>
+        </p:spPr>
+        <p:style>
+          <a:lnRef idx="2">
+            <a:schemeClr val="accent2"/>
+          </a:lnRef>
+          <a:fillRef idx="1">
+            <a:schemeClr val="lt1"/>
+          </a:fillRef>
+          <a:effectRef idx="0">
+            <a:schemeClr val="accent2"/>
+          </a:effectRef>
+          <a:fontRef idx="minor">
+            <a:schemeClr val="dk1"/>
+          </a:fontRef>
+        </p:style>
+        <p:txBody>
+          <a:bodyPr rtlCol="0" anchor="ctr"/>
+          <a:lstStyle/>
+          <a:p>
+            <a:pPr algn="ctr"/>
+            <a:endParaRPr lang="en-US"/>
+          </a:p>
+        </p:txBody>
+      </p:sp>
+      <p:sp>
+        <p:nvSpPr>
+          <p:cNvPr id="66" name="Double Bracket 65"/>
+          <p:cNvSpPr/>
+          <p:nvPr/>
+        </p:nvSpPr>
+        <p:spPr>
+          <a:xfrm rot="5400000">
+            <a:off x="5190859" y="4016382"/>
+            <a:ext cx="914400" cy="850392"/>
+          </a:xfrm>
+          <a:prstGeom prst="bracketPair">
+            <a:avLst/>
+          </a:prstGeom>
+          <a:ln>
+            <a:solidFill>
+              <a:schemeClr val="tx2"/>
+            </a:solidFill>
+          </a:ln>
+          <a:effectLst/>
+        </p:spPr>
+        <p:style>
+          <a:lnRef idx="2">
+            <a:schemeClr val="accent1"/>
+          </a:lnRef>
+          <a:fillRef idx="0">
+            <a:schemeClr val="accent1"/>
+          </a:fillRef>
+          <a:effectRef idx="1">
+            <a:schemeClr val="accent1"/>
+          </a:effectRef>
+          <a:fontRef idx="minor">
+            <a:schemeClr val="tx1"/>
+          </a:fontRef>
+        </p:style>
+        <p:txBody>
+          <a:bodyPr numCol="1" spcCol="914400" rtlCol="0" anchor="ctr"/>
+          <a:lstStyle/>
+          <a:p>
+            <a:pPr algn="just"/>
+            <a:endParaRPr lang="en-US" baseline="-25000" dirty="0"/>
+          </a:p>
+        </p:txBody>
+      </p:sp>
+      <p:sp>
+        <p:nvSpPr>
+          <p:cNvPr id="67" name="TextBox 66"/>
+          <p:cNvSpPr txBox="1"/>
+          <p:nvPr/>
+        </p:nvSpPr>
+        <p:spPr>
+          <a:xfrm>
+            <a:off x="5249426" y="3971880"/>
+            <a:ext cx="902797" cy="369332"/>
+          </a:xfrm>
+          <a:prstGeom prst="rect">
+            <a:avLst/>
+          </a:prstGeom>
+          <a:noFill/>
+        </p:spPr>
+        <p:txBody>
+          <a:bodyPr wrap="square" rtlCol="0">
+            <a:spAutoFit/>
+          </a:bodyPr>
+          <a:lstStyle/>
+          <a:p>
+            <a:r>
+              <a:rPr lang="en-US" dirty="0" smtClean="0">
+                <a:solidFill>
+                  <a:schemeClr val="tx2"/>
+                </a:solidFill>
+                <a:cs typeface="Neo Sans Intel"/>
+              </a:rPr>
+              <a:t>a</a:t>
+            </a:r>
+            <a:r>
+              <a:rPr lang="en-US" baseline="-25000" dirty="0">
+                <a:solidFill>
+                  <a:schemeClr val="tx2"/>
+                </a:solidFill>
+                <a:cs typeface="Neo Sans Intel"/>
+              </a:rPr>
+              <a:t>6</a:t>
+            </a:r>
+            <a:r>
+              <a:rPr lang="en-US" baseline="-25000" dirty="0" smtClean="0">
+                <a:solidFill>
+                  <a:schemeClr val="tx2"/>
+                </a:solidFill>
+                <a:cs typeface="Neo Sans Intel"/>
+              </a:rPr>
+              <a:t>0</a:t>
+            </a:r>
+            <a:r>
+              <a:rPr lang="en-US" dirty="0" smtClean="0">
+                <a:solidFill>
+                  <a:schemeClr val="tx2"/>
+                </a:solidFill>
+                <a:cs typeface="Neo Sans Intel"/>
+              </a:rPr>
+              <a:t>  a</a:t>
+            </a:r>
+            <a:r>
+              <a:rPr lang="en-US" baseline="-25000" dirty="0">
+                <a:solidFill>
+                  <a:schemeClr val="tx2"/>
+                </a:solidFill>
+                <a:cs typeface="Neo Sans Intel"/>
+              </a:rPr>
+              <a:t>6</a:t>
+            </a:r>
+            <a:r>
+              <a:rPr lang="en-US" baseline="-25000" dirty="0" smtClean="0">
+                <a:solidFill>
+                  <a:schemeClr val="tx2"/>
+                </a:solidFill>
+                <a:cs typeface="Neo Sans Intel"/>
+              </a:rPr>
+              <a:t>1</a:t>
+            </a:r>
+            <a:endParaRPr lang="en-US" dirty="0" smtClean="0">
+              <a:solidFill>
+                <a:schemeClr val="tx2"/>
+              </a:solidFill>
+              <a:cs typeface="Neo Sans Intel"/>
+            </a:endParaRPr>
+          </a:p>
+        </p:txBody>
+      </p:sp>
+      <p:sp>
+        <p:nvSpPr>
+          <p:cNvPr id="68" name="TextBox 67"/>
+          <p:cNvSpPr txBox="1"/>
+          <p:nvPr/>
+        </p:nvSpPr>
+        <p:spPr>
+          <a:xfrm>
+            <a:off x="5249425" y="4226329"/>
+            <a:ext cx="902800" cy="369332"/>
+          </a:xfrm>
+          <a:prstGeom prst="rect">
+            <a:avLst/>
+          </a:prstGeom>
+          <a:noFill/>
+        </p:spPr>
+        <p:txBody>
+          <a:bodyPr wrap="square" rtlCol="0">
+            <a:spAutoFit/>
+          </a:bodyPr>
+          <a:lstStyle/>
+          <a:p>
+            <a:r>
+              <a:rPr lang="en-US" dirty="0" smtClean="0">
+                <a:solidFill>
+                  <a:schemeClr val="tx2"/>
+                </a:solidFill>
+                <a:cs typeface="Neo Sans Intel"/>
+              </a:rPr>
+              <a:t>a</a:t>
+            </a:r>
+            <a:r>
+              <a:rPr lang="en-US" baseline="-25000" dirty="0">
+                <a:solidFill>
+                  <a:schemeClr val="tx2"/>
+                </a:solidFill>
+                <a:cs typeface="Neo Sans Intel"/>
+              </a:rPr>
+              <a:t>7</a:t>
+            </a:r>
+            <a:r>
+              <a:rPr lang="en-US" baseline="-25000" dirty="0" smtClean="0">
+                <a:solidFill>
+                  <a:schemeClr val="tx2"/>
+                </a:solidFill>
+                <a:cs typeface="Neo Sans Intel"/>
+              </a:rPr>
+              <a:t>0</a:t>
+            </a:r>
+            <a:r>
+              <a:rPr lang="en-US" dirty="0" smtClean="0">
+                <a:solidFill>
+                  <a:schemeClr val="tx2"/>
+                </a:solidFill>
+                <a:cs typeface="Neo Sans Intel"/>
+              </a:rPr>
+              <a:t>  </a:t>
+            </a:r>
+            <a:r>
+              <a:rPr lang="en-US" dirty="0" smtClean="0">
+                <a:solidFill>
+                  <a:schemeClr val="tx2"/>
+                </a:solidFill>
+                <a:cs typeface="Neo Sans Intel"/>
+              </a:rPr>
+              <a:t>a</a:t>
+            </a:r>
+            <a:r>
+              <a:rPr lang="en-US" baseline="-25000" dirty="0">
+                <a:solidFill>
+                  <a:schemeClr val="tx2"/>
+                </a:solidFill>
+                <a:cs typeface="Neo Sans Intel"/>
+              </a:rPr>
+              <a:t>7</a:t>
+            </a:r>
+            <a:r>
+              <a:rPr lang="en-US" baseline="-25000" dirty="0" smtClean="0">
+                <a:solidFill>
+                  <a:schemeClr val="tx2"/>
+                </a:solidFill>
+                <a:cs typeface="Neo Sans Intel"/>
+              </a:rPr>
+              <a:t>1</a:t>
+            </a:r>
+            <a:endParaRPr lang="en-US" dirty="0" smtClean="0">
+              <a:solidFill>
+                <a:schemeClr val="tx2"/>
+              </a:solidFill>
+              <a:cs typeface="Neo Sans Intel"/>
+            </a:endParaRPr>
+          </a:p>
+        </p:txBody>
+      </p:sp>
+      <p:sp>
+        <p:nvSpPr>
+          <p:cNvPr id="69" name="TextBox 68"/>
+          <p:cNvSpPr txBox="1"/>
+          <p:nvPr/>
+        </p:nvSpPr>
+        <p:spPr>
+          <a:xfrm>
+            <a:off x="5249423" y="4471351"/>
+            <a:ext cx="902800" cy="369332"/>
+          </a:xfrm>
+          <a:prstGeom prst="rect">
+            <a:avLst/>
+          </a:prstGeom>
+          <a:noFill/>
+        </p:spPr>
+        <p:txBody>
+          <a:bodyPr wrap="square" rtlCol="0">
+            <a:spAutoFit/>
+          </a:bodyPr>
+          <a:lstStyle/>
+          <a:p>
+            <a:r>
+              <a:rPr lang="en-US" dirty="0" smtClean="0">
+                <a:solidFill>
+                  <a:schemeClr val="tx2"/>
+                </a:solidFill>
+                <a:cs typeface="Neo Sans Intel"/>
+              </a:rPr>
+              <a:t>a</a:t>
+            </a:r>
+            <a:r>
+              <a:rPr lang="en-US" baseline="-25000" dirty="0">
+                <a:solidFill>
+                  <a:schemeClr val="tx2"/>
+                </a:solidFill>
+                <a:cs typeface="Neo Sans Intel"/>
+              </a:rPr>
+              <a:t>8</a:t>
+            </a:r>
+            <a:r>
+              <a:rPr lang="en-US" baseline="-25000" dirty="0" smtClean="0">
+                <a:solidFill>
+                  <a:schemeClr val="tx2"/>
+                </a:solidFill>
+                <a:cs typeface="Neo Sans Intel"/>
+              </a:rPr>
+              <a:t>0</a:t>
+            </a:r>
+            <a:r>
+              <a:rPr lang="en-US" dirty="0" smtClean="0">
+                <a:solidFill>
+                  <a:schemeClr val="tx2"/>
+                </a:solidFill>
+                <a:cs typeface="Neo Sans Intel"/>
+              </a:rPr>
+              <a:t>  </a:t>
+            </a:r>
+            <a:r>
+              <a:rPr lang="en-US" dirty="0" smtClean="0">
+                <a:solidFill>
+                  <a:schemeClr val="tx2"/>
+                </a:solidFill>
+                <a:cs typeface="Neo Sans Intel"/>
+              </a:rPr>
+              <a:t>a</a:t>
+            </a:r>
+            <a:r>
+              <a:rPr lang="en-US" baseline="-25000" dirty="0">
+                <a:solidFill>
+                  <a:schemeClr val="tx2"/>
+                </a:solidFill>
+                <a:cs typeface="Neo Sans Intel"/>
+              </a:rPr>
+              <a:t>8</a:t>
+            </a:r>
+            <a:r>
+              <a:rPr lang="en-US" baseline="-25000" dirty="0" smtClean="0">
+                <a:solidFill>
+                  <a:schemeClr val="tx2"/>
+                </a:solidFill>
+                <a:cs typeface="Neo Sans Intel"/>
+              </a:rPr>
+              <a:t>1</a:t>
+            </a:r>
+            <a:endParaRPr lang="en-US" dirty="0" smtClean="0">
+              <a:solidFill>
+                <a:schemeClr val="tx2"/>
+              </a:solidFill>
+              <a:cs typeface="Neo Sans Intel"/>
+            </a:endParaRPr>
+          </a:p>
+        </p:txBody>
+      </p:sp>
+      <p:sp>
+        <p:nvSpPr>
+          <p:cNvPr id="2" name="TextBox 1"/>
+          <p:cNvSpPr txBox="1"/>
+          <p:nvPr/>
+        </p:nvSpPr>
+        <p:spPr>
+          <a:xfrm>
+            <a:off x="2579560" y="1082043"/>
+            <a:ext cx="1899431" cy="338554"/>
+          </a:xfrm>
+          <a:prstGeom prst="rect">
+            <a:avLst/>
+          </a:prstGeom>
+          <a:noFill/>
+        </p:spPr>
+        <p:txBody>
+          <a:bodyPr wrap="none" rtlCol="0">
+            <a:spAutoFit/>
+          </a:bodyPr>
+          <a:lstStyle/>
+          <a:p>
+            <a:r>
+              <a:rPr lang="en-US" sz="1600" dirty="0" smtClean="0"/>
+              <a:t>1D array distribution</a:t>
+            </a:r>
+            <a:endParaRPr lang="en-US" sz="1600" dirty="0"/>
+          </a:p>
+        </p:txBody>
+      </p:sp>
+      <p:sp>
+        <p:nvSpPr>
+          <p:cNvPr id="70" name="TextBox 69"/>
+          <p:cNvSpPr txBox="1"/>
+          <p:nvPr/>
+        </p:nvSpPr>
+        <p:spPr>
+          <a:xfrm>
+            <a:off x="4666446" y="1086160"/>
+            <a:ext cx="1899431" cy="338554"/>
+          </a:xfrm>
+          <a:prstGeom prst="rect">
+            <a:avLst/>
+          </a:prstGeom>
+          <a:noFill/>
+        </p:spPr>
+        <p:txBody>
+          <a:bodyPr wrap="none" rtlCol="0">
+            <a:spAutoFit/>
+          </a:bodyPr>
+          <a:lstStyle/>
+          <a:p>
+            <a:r>
+              <a:rPr lang="en-US" sz="1600" dirty="0"/>
+              <a:t>2</a:t>
+            </a:r>
+            <a:r>
+              <a:rPr lang="en-US" sz="1600" dirty="0" smtClean="0"/>
+              <a:t>D array distribution</a:t>
+            </a:r>
+            <a:endParaRPr lang="en-US" sz="1600" dirty="0"/>
+          </a:p>
+        </p:txBody>
+      </p:sp>
     </p:spTree>
     <p:extLst>
       <p:ext uri="{BB962C8B-B14F-4D97-AF65-F5344CB8AC3E}">

</xml_diff>